<commit_message>
add placeholder for parameters ad update slides
</commit_message>
<xml_diff>
--- a/Stochastic_TESS_Slide1.pptx
+++ b/Stochastic_TESS_Slide1.pptx
@@ -6937,12 +6937,12 @@
             <p:spPr>
               <a:xfrm>
                 <a:off x="838200" y="1365662"/>
-                <a:ext cx="10515600" cy="4811301"/>
+                <a:ext cx="10933386" cy="4811301"/>
               </a:xfrm>
             </p:spPr>
             <p:txBody>
               <a:bodyPr>
-                <a:normAutofit fontScale="92500" lnSpcReduction="10000"/>
+                <a:normAutofit fontScale="92500"/>
               </a:bodyPr>
               <a:lstStyle/>
               <a:p>
@@ -6987,22 +6987,16 @@
                       </m:e>
                       <m:sub>
                         <m:r>
-                          <a:rPr lang="en-US" b="0" i="1" smtClean="0">
+                          <a:rPr lang="en-US" i="1">
                             <a:latin typeface="Cambria Math" panose="02040503050406030204" pitchFamily="18" charset="0"/>
                           </a:rPr>
                           <m:t>𝑧</m:t>
                         </m:r>
                         <m:r>
-                          <a:rPr lang="en-US" b="0" i="1" smtClean="0">
-                            <a:latin typeface="Cambria Math" panose="02040503050406030204" pitchFamily="18" charset="0"/>
-                          </a:rPr>
-                          <m:t>,</m:t>
-                        </m:r>
-                        <m:r>
-                          <a:rPr lang="en-US" i="1" dirty="0">
-                            <a:latin typeface="Cambria Math" panose="02040503050406030204" pitchFamily="18" charset="0"/>
-                          </a:rPr>
-                          <m:t>𝑡</m:t>
+                          <a:rPr lang="en-US" i="1">
+                            <a:latin typeface="Cambria Math" panose="02040503050406030204" pitchFamily="18" charset="0"/>
+                          </a:rPr>
+                          <m:t>,1</m:t>
                         </m:r>
                       </m:sub>
                     </m:sSub>
@@ -7015,7 +7009,10 @@
                     <m:sSub>
                       <m:sSubPr>
                         <m:ctrlPr>
-                          <a:rPr lang="en-US" i="1" dirty="0">
+                          <a:rPr lang="en-US" i="1" dirty="0" smtClean="0">
+                            <a:solidFill>
+                              <a:srgbClr val="FF0000"/>
+                            </a:solidFill>
                             <a:latin typeface="Cambria Math" panose="02040503050406030204" pitchFamily="18" charset="0"/>
                           </a:rPr>
                         </m:ctrlPr>
@@ -7023,6 +7020,9 @@
                       <m:e>
                         <m:r>
                           <a:rPr lang="en-US" i="1" dirty="0">
+                            <a:solidFill>
+                              <a:srgbClr val="FF0000"/>
+                            </a:solidFill>
                             <a:latin typeface="Cambria Math" panose="02040503050406030204" pitchFamily="18" charset="0"/>
                           </a:rPr>
                           <m:t>𝑎</m:t>
@@ -7031,9 +7031,30 @@
                       <m:sub>
                         <m:r>
                           <a:rPr lang="en-US" i="1" dirty="0">
+                            <a:solidFill>
+                              <a:srgbClr val="FF0000"/>
+                            </a:solidFill>
                             <a:latin typeface="Cambria Math" panose="02040503050406030204" pitchFamily="18" charset="0"/>
                           </a:rPr>
                           <m:t>1</m:t>
+                        </m:r>
+                        <m:r>
+                          <a:rPr lang="en-US" b="0" i="1" dirty="0" smtClean="0">
+                            <a:solidFill>
+                              <a:srgbClr val="FF0000"/>
+                            </a:solidFill>
+                            <a:latin typeface="Cambria Math" panose="02040503050406030204" pitchFamily="18" charset="0"/>
+                          </a:rPr>
+                          <m:t>,</m:t>
+                        </m:r>
+                        <m:r>
+                          <a:rPr lang="en-US" b="0" i="1" dirty="0" smtClean="0">
+                            <a:solidFill>
+                              <a:srgbClr val="FF0000"/>
+                            </a:solidFill>
+                            <a:latin typeface="Cambria Math" panose="02040503050406030204" pitchFamily="18" charset="0"/>
+                          </a:rPr>
+                          <m:t>𝑧</m:t>
                         </m:r>
                       </m:sub>
                     </m:sSub>
@@ -7072,13 +7093,7 @@
                           <a:rPr lang="en-US" b="0" i="1" dirty="0" smtClean="0">
                             <a:latin typeface="Cambria Math" panose="02040503050406030204" pitchFamily="18" charset="0"/>
                           </a:rPr>
-                          <m:t>𝑡</m:t>
-                        </m:r>
-                        <m:r>
-                          <a:rPr lang="en-US" b="0" i="1" dirty="0" smtClean="0">
-                            <a:latin typeface="Cambria Math" panose="02040503050406030204" pitchFamily="18" charset="0"/>
-                          </a:rPr>
-                          <m:t>−1</m:t>
+                          <m:t>0</m:t>
                         </m:r>
                       </m:sup>
                     </m:sSubSup>
@@ -7091,7 +7106,10 @@
                     <m:sSub>
                       <m:sSubPr>
                         <m:ctrlPr>
-                          <a:rPr lang="en-US" i="1" dirty="0">
+                          <a:rPr lang="en-US" i="1" dirty="0" smtClean="0">
+                            <a:solidFill>
+                              <a:srgbClr val="FF0000"/>
+                            </a:solidFill>
                             <a:latin typeface="Cambria Math" panose="02040503050406030204" pitchFamily="18" charset="0"/>
                           </a:rPr>
                         </m:ctrlPr>
@@ -7099,6 +7117,9 @@
                       <m:e>
                         <m:r>
                           <a:rPr lang="en-US" i="1" dirty="0">
+                            <a:solidFill>
+                              <a:srgbClr val="FF0000"/>
+                            </a:solidFill>
                             <a:latin typeface="Cambria Math" panose="02040503050406030204" pitchFamily="18" charset="0"/>
                           </a:rPr>
                           <m:t>𝑎</m:t>
@@ -7107,9 +7128,30 @@
                       <m:sub>
                         <m:r>
                           <a:rPr lang="en-US" i="1" dirty="0">
+                            <a:solidFill>
+                              <a:srgbClr val="FF0000"/>
+                            </a:solidFill>
                             <a:latin typeface="Cambria Math" panose="02040503050406030204" pitchFamily="18" charset="0"/>
                           </a:rPr>
                           <m:t>2</m:t>
+                        </m:r>
+                        <m:r>
+                          <a:rPr lang="en-US" b="0" i="1" dirty="0" smtClean="0">
+                            <a:solidFill>
+                              <a:srgbClr val="FF0000"/>
+                            </a:solidFill>
+                            <a:latin typeface="Cambria Math" panose="02040503050406030204" pitchFamily="18" charset="0"/>
+                          </a:rPr>
+                          <m:t>,</m:t>
+                        </m:r>
+                        <m:r>
+                          <a:rPr lang="en-US" b="0" i="1" dirty="0" smtClean="0">
+                            <a:solidFill>
+                              <a:srgbClr val="FF0000"/>
+                            </a:solidFill>
+                            <a:latin typeface="Cambria Math" panose="02040503050406030204" pitchFamily="18" charset="0"/>
+                          </a:rPr>
+                          <m:t>𝑧</m:t>
                         </m:r>
                       </m:sub>
                     </m:sSub>
@@ -7145,6 +7187,423 @@
                       </m:sub>
                       <m:sup>
                         <m:r>
+                          <a:rPr lang="en-US" b="0" i="1" dirty="0" smtClean="0">
+                            <a:latin typeface="Cambria Math" panose="02040503050406030204" pitchFamily="18" charset="0"/>
+                          </a:rPr>
+                          <m:t>1</m:t>
+                        </m:r>
+                      </m:sup>
+                    </m:sSubSup>
+                    <m:r>
+                      <a:rPr lang="en-US" i="1" dirty="0">
+                        <a:latin typeface="Cambria Math" panose="02040503050406030204" pitchFamily="18" charset="0"/>
+                      </a:rPr>
+                      <m:t>+ </m:t>
+                    </m:r>
+                    <m:sSub>
+                      <m:sSubPr>
+                        <m:ctrlPr>
+                          <a:rPr lang="en-US" i="1" dirty="0" smtClean="0">
+                            <a:solidFill>
+                              <a:srgbClr val="FF0000"/>
+                            </a:solidFill>
+                            <a:latin typeface="Cambria Math" panose="02040503050406030204" pitchFamily="18" charset="0"/>
+                          </a:rPr>
+                        </m:ctrlPr>
+                      </m:sSubPr>
+                      <m:e>
+                        <m:r>
+                          <a:rPr lang="en-US" i="1" dirty="0">
+                            <a:solidFill>
+                              <a:srgbClr val="FF0000"/>
+                            </a:solidFill>
+                            <a:latin typeface="Cambria Math" panose="02040503050406030204" pitchFamily="18" charset="0"/>
+                          </a:rPr>
+                          <m:t>𝑎</m:t>
+                        </m:r>
+                      </m:e>
+                      <m:sub>
+                        <m:r>
+                          <a:rPr lang="en-US" i="1" dirty="0">
+                            <a:solidFill>
+                              <a:srgbClr val="FF0000"/>
+                            </a:solidFill>
+                            <a:latin typeface="Cambria Math" panose="02040503050406030204" pitchFamily="18" charset="0"/>
+                          </a:rPr>
+                          <m:t>3</m:t>
+                        </m:r>
+                        <m:r>
+                          <a:rPr lang="en-US" b="0" i="1" dirty="0" smtClean="0">
+                            <a:solidFill>
+                              <a:srgbClr val="FF0000"/>
+                            </a:solidFill>
+                            <a:latin typeface="Cambria Math" panose="02040503050406030204" pitchFamily="18" charset="0"/>
+                          </a:rPr>
+                          <m:t>,</m:t>
+                        </m:r>
+                        <m:r>
+                          <a:rPr lang="en-US" b="0" i="1" dirty="0" smtClean="0">
+                            <a:solidFill>
+                              <a:srgbClr val="FF0000"/>
+                            </a:solidFill>
+                            <a:latin typeface="Cambria Math" panose="02040503050406030204" pitchFamily="18" charset="0"/>
+                          </a:rPr>
+                          <m:t>𝑧</m:t>
+                        </m:r>
+                      </m:sub>
+                    </m:sSub>
+                    <m:r>
+                      <a:rPr lang="en-US" i="1" dirty="0">
+                        <a:latin typeface="Cambria Math" panose="02040503050406030204" pitchFamily="18" charset="0"/>
+                      </a:rPr>
+                      <m:t>∗</m:t>
+                    </m:r>
+                    <m:sSubSup>
+                      <m:sSubSupPr>
+                        <m:ctrlPr>
+                          <a:rPr lang="en-US" i="1" dirty="0">
+                            <a:latin typeface="Cambria Math" panose="02040503050406030204" pitchFamily="18" charset="0"/>
+                          </a:rPr>
+                        </m:ctrlPr>
+                      </m:sSubSupPr>
+                      <m:e>
+                        <m:r>
+                          <a:rPr lang="en-US" i="1" dirty="0">
+                            <a:latin typeface="Cambria Math" panose="02040503050406030204" pitchFamily="18" charset="0"/>
+                          </a:rPr>
+                          <m:t>𝑇</m:t>
+                        </m:r>
+                      </m:e>
+                      <m:sub>
+                        <m:r>
+                          <a:rPr lang="en-US" b="0" i="1" dirty="0" smtClean="0">
+                            <a:latin typeface="Cambria Math" panose="02040503050406030204" pitchFamily="18" charset="0"/>
+                          </a:rPr>
+                          <m:t>𝑧</m:t>
+                        </m:r>
+                      </m:sub>
+                      <m:sup>
+                        <m:r>
+                          <a:rPr lang="en-US" b="0" i="1" dirty="0" smtClean="0">
+                            <a:latin typeface="Cambria Math" panose="02040503050406030204" pitchFamily="18" charset="0"/>
+                          </a:rPr>
+                          <m:t>1</m:t>
+                        </m:r>
+                      </m:sup>
+                    </m:sSubSup>
+                    <m:r>
+                      <a:rPr lang="en-US" i="1" dirty="0">
+                        <a:latin typeface="Cambria Math" panose="02040503050406030204" pitchFamily="18" charset="0"/>
+                      </a:rPr>
+                      <m:t>+</m:t>
+                    </m:r>
+                    <m:sSub>
+                      <m:sSubPr>
+                        <m:ctrlPr>
+                          <a:rPr lang="en-US" i="1" dirty="0" smtClean="0">
+                            <a:solidFill>
+                              <a:srgbClr val="FF0000"/>
+                            </a:solidFill>
+                            <a:latin typeface="Cambria Math" panose="02040503050406030204" pitchFamily="18" charset="0"/>
+                          </a:rPr>
+                        </m:ctrlPr>
+                      </m:sSubPr>
+                      <m:e>
+                        <m:r>
+                          <a:rPr lang="en-US" i="1" dirty="0">
+                            <a:solidFill>
+                              <a:srgbClr val="FF0000"/>
+                            </a:solidFill>
+                            <a:latin typeface="Cambria Math" panose="02040503050406030204" pitchFamily="18" charset="0"/>
+                          </a:rPr>
+                          <m:t>𝑎</m:t>
+                        </m:r>
+                      </m:e>
+                      <m:sub>
+                        <m:r>
+                          <a:rPr lang="en-US" i="1" dirty="0">
+                            <a:solidFill>
+                              <a:srgbClr val="FF0000"/>
+                            </a:solidFill>
+                            <a:latin typeface="Cambria Math" panose="02040503050406030204" pitchFamily="18" charset="0"/>
+                          </a:rPr>
+                          <m:t>4</m:t>
+                        </m:r>
+                        <m:r>
+                          <a:rPr lang="en-US" b="0" i="1" dirty="0" smtClean="0">
+                            <a:solidFill>
+                              <a:srgbClr val="FF0000"/>
+                            </a:solidFill>
+                            <a:latin typeface="Cambria Math" panose="02040503050406030204" pitchFamily="18" charset="0"/>
+                          </a:rPr>
+                          <m:t>,</m:t>
+                        </m:r>
+                        <m:r>
+                          <a:rPr lang="en-US" b="0" i="1" dirty="0" smtClean="0">
+                            <a:solidFill>
+                              <a:srgbClr val="FF0000"/>
+                            </a:solidFill>
+                            <a:latin typeface="Cambria Math" panose="02040503050406030204" pitchFamily="18" charset="0"/>
+                          </a:rPr>
+                          <m:t>𝑧</m:t>
+                        </m:r>
+                      </m:sub>
+                    </m:sSub>
+                  </m:oMath>
+                </a14:m>
+                <a:r>
+                  <a:rPr lang="en-US" dirty="0">
+                    <a:latin typeface="Cambria Math" panose="02040503050406030204" pitchFamily="18" charset="0"/>
+                  </a:rPr>
+                  <a:t> ,		for t=1</a:t>
+                </a:r>
+              </a:p>
+              <a:p>
+                <a:pPr lvl="1"/>
+                <a14:m>
+                  <m:oMath xmlns:m="http://schemas.openxmlformats.org/officeDocument/2006/math">
+                    <m:sSub>
+                      <m:sSubPr>
+                        <m:ctrlPr>
+                          <a:rPr lang="en-US" i="1" dirty="0">
+                            <a:latin typeface="Cambria Math" panose="02040503050406030204" pitchFamily="18" charset="0"/>
+                          </a:rPr>
+                        </m:ctrlPr>
+                      </m:sSubPr>
+                      <m:e>
+                        <m:acc>
+                          <m:accPr>
+                            <m:chr m:val="̇"/>
+                            <m:ctrlPr>
+                              <a:rPr lang="en-US" i="1">
+                                <a:latin typeface="Cambria Math" panose="02040503050406030204" pitchFamily="18" charset="0"/>
+                              </a:rPr>
+                            </m:ctrlPr>
+                          </m:accPr>
+                          <m:e>
+                            <m:r>
+                              <a:rPr lang="en-US" i="1">
+                                <a:latin typeface="Cambria Math" panose="02040503050406030204" pitchFamily="18" charset="0"/>
+                              </a:rPr>
+                              <m:t>𝑚</m:t>
+                            </m:r>
+                          </m:e>
+                        </m:acc>
+                      </m:e>
+                      <m:sub>
+                        <m:r>
+                          <a:rPr lang="en-US" b="0" i="1" smtClean="0">
+                            <a:latin typeface="Cambria Math" panose="02040503050406030204" pitchFamily="18" charset="0"/>
+                          </a:rPr>
+                          <m:t>𝑧</m:t>
+                        </m:r>
+                        <m:r>
+                          <a:rPr lang="en-US" b="0" i="1" smtClean="0">
+                            <a:latin typeface="Cambria Math" panose="02040503050406030204" pitchFamily="18" charset="0"/>
+                          </a:rPr>
+                          <m:t>,</m:t>
+                        </m:r>
+                        <m:r>
+                          <a:rPr lang="en-US" i="1" dirty="0">
+                            <a:latin typeface="Cambria Math" panose="02040503050406030204" pitchFamily="18" charset="0"/>
+                          </a:rPr>
+                          <m:t>𝑡</m:t>
+                        </m:r>
+                      </m:sub>
+                    </m:sSub>
+                    <m:r>
+                      <a:rPr lang="en-US" i="1" dirty="0">
+                        <a:latin typeface="Cambria Math" panose="02040503050406030204" pitchFamily="18" charset="0"/>
+                      </a:rPr>
+                      <m:t>=</m:t>
+                    </m:r>
+                    <m:sSub>
+                      <m:sSubPr>
+                        <m:ctrlPr>
+                          <a:rPr lang="en-US" i="1" dirty="0" smtClean="0">
+                            <a:solidFill>
+                              <a:srgbClr val="FF0000"/>
+                            </a:solidFill>
+                            <a:latin typeface="Cambria Math" panose="02040503050406030204" pitchFamily="18" charset="0"/>
+                          </a:rPr>
+                        </m:ctrlPr>
+                      </m:sSubPr>
+                      <m:e>
+                        <m:r>
+                          <a:rPr lang="en-US" i="1" dirty="0">
+                            <a:solidFill>
+                              <a:srgbClr val="FF0000"/>
+                            </a:solidFill>
+                            <a:latin typeface="Cambria Math" panose="02040503050406030204" pitchFamily="18" charset="0"/>
+                          </a:rPr>
+                          <m:t>𝑎</m:t>
+                        </m:r>
+                      </m:e>
+                      <m:sub>
+                        <m:r>
+                          <a:rPr lang="en-US" i="1" dirty="0">
+                            <a:solidFill>
+                              <a:srgbClr val="FF0000"/>
+                            </a:solidFill>
+                            <a:latin typeface="Cambria Math" panose="02040503050406030204" pitchFamily="18" charset="0"/>
+                          </a:rPr>
+                          <m:t>1</m:t>
+                        </m:r>
+                        <m:r>
+                          <a:rPr lang="en-US" b="0" i="1" dirty="0" smtClean="0">
+                            <a:solidFill>
+                              <a:srgbClr val="FF0000"/>
+                            </a:solidFill>
+                            <a:latin typeface="Cambria Math" panose="02040503050406030204" pitchFamily="18" charset="0"/>
+                          </a:rPr>
+                          <m:t>,</m:t>
+                        </m:r>
+                        <m:r>
+                          <a:rPr lang="en-US" b="0" i="1" dirty="0" smtClean="0">
+                            <a:solidFill>
+                              <a:srgbClr val="FF0000"/>
+                            </a:solidFill>
+                            <a:latin typeface="Cambria Math" panose="02040503050406030204" pitchFamily="18" charset="0"/>
+                          </a:rPr>
+                          <m:t>𝑧</m:t>
+                        </m:r>
+                      </m:sub>
+                    </m:sSub>
+                    <m:r>
+                      <a:rPr lang="en-US" i="1" dirty="0">
+                        <a:latin typeface="Cambria Math" panose="02040503050406030204" pitchFamily="18" charset="0"/>
+                      </a:rPr>
+                      <m:t>∗</m:t>
+                    </m:r>
+                    <m:sSubSup>
+                      <m:sSubSupPr>
+                        <m:ctrlPr>
+                          <a:rPr lang="en-US" i="1" dirty="0">
+                            <a:latin typeface="Cambria Math" panose="02040503050406030204" pitchFamily="18" charset="0"/>
+                          </a:rPr>
+                        </m:ctrlPr>
+                      </m:sSubSupPr>
+                      <m:e>
+                        <m:r>
+                          <a:rPr lang="en-US" i="1" dirty="0">
+                            <a:latin typeface="Cambria Math" panose="02040503050406030204" pitchFamily="18" charset="0"/>
+                          </a:rPr>
+                          <m:t>𝑇</m:t>
+                        </m:r>
+                      </m:e>
+                      <m:sub>
+                        <m:r>
+                          <a:rPr lang="en-US" b="0" i="1" dirty="0" smtClean="0">
+                            <a:latin typeface="Cambria Math" panose="02040503050406030204" pitchFamily="18" charset="0"/>
+                          </a:rPr>
+                          <m:t>𝑧</m:t>
+                        </m:r>
+                      </m:sub>
+                      <m:sup>
+                        <m:r>
+                          <a:rPr lang="en-US" b="0" i="1" dirty="0" smtClean="0">
+                            <a:latin typeface="Cambria Math" panose="02040503050406030204" pitchFamily="18" charset="0"/>
+                          </a:rPr>
+                          <m:t>𝑡</m:t>
+                        </m:r>
+                        <m:r>
+                          <a:rPr lang="en-US" b="0" i="1" dirty="0" smtClean="0">
+                            <a:latin typeface="Cambria Math" panose="02040503050406030204" pitchFamily="18" charset="0"/>
+                          </a:rPr>
+                          <m:t>−1</m:t>
+                        </m:r>
+                      </m:sup>
+                    </m:sSubSup>
+                    <m:r>
+                      <a:rPr lang="en-US" i="1" dirty="0">
+                        <a:latin typeface="Cambria Math" panose="02040503050406030204" pitchFamily="18" charset="0"/>
+                      </a:rPr>
+                      <m:t>+ </m:t>
+                    </m:r>
+                    <m:sSub>
+                      <m:sSubPr>
+                        <m:ctrlPr>
+                          <a:rPr lang="en-US" i="1" dirty="0" smtClean="0">
+                            <a:solidFill>
+                              <a:srgbClr val="FF0000"/>
+                            </a:solidFill>
+                            <a:latin typeface="Cambria Math" panose="02040503050406030204" pitchFamily="18" charset="0"/>
+                          </a:rPr>
+                        </m:ctrlPr>
+                      </m:sSubPr>
+                      <m:e>
+                        <m:r>
+                          <a:rPr lang="en-US" i="1" dirty="0">
+                            <a:solidFill>
+                              <a:srgbClr val="FF0000"/>
+                            </a:solidFill>
+                            <a:latin typeface="Cambria Math" panose="02040503050406030204" pitchFamily="18" charset="0"/>
+                          </a:rPr>
+                          <m:t>𝑎</m:t>
+                        </m:r>
+                      </m:e>
+                      <m:sub>
+                        <m:r>
+                          <a:rPr lang="en-US" i="1" dirty="0">
+                            <a:solidFill>
+                              <a:srgbClr val="FF0000"/>
+                            </a:solidFill>
+                            <a:latin typeface="Cambria Math" panose="02040503050406030204" pitchFamily="18" charset="0"/>
+                          </a:rPr>
+                          <m:t>2</m:t>
+                        </m:r>
+                        <m:r>
+                          <a:rPr lang="en-US" b="0" i="1" dirty="0" smtClean="0">
+                            <a:solidFill>
+                              <a:srgbClr val="FF0000"/>
+                            </a:solidFill>
+                            <a:latin typeface="Cambria Math" panose="02040503050406030204" pitchFamily="18" charset="0"/>
+                          </a:rPr>
+                          <m:t>,</m:t>
+                        </m:r>
+                        <m:r>
+                          <a:rPr lang="en-US" b="0" i="1" dirty="0" smtClean="0">
+                            <a:solidFill>
+                              <a:srgbClr val="FF0000"/>
+                            </a:solidFill>
+                            <a:latin typeface="Cambria Math" panose="02040503050406030204" pitchFamily="18" charset="0"/>
+                          </a:rPr>
+                          <m:t>𝑧</m:t>
+                        </m:r>
+                      </m:sub>
+                    </m:sSub>
+                    <m:r>
+                      <a:rPr lang="en-US" i="1" dirty="0">
+                        <a:latin typeface="Cambria Math" panose="02040503050406030204" pitchFamily="18" charset="0"/>
+                      </a:rPr>
+                      <m:t>∗</m:t>
+                    </m:r>
+                    <m:sSubSup>
+                      <m:sSubSupPr>
+                        <m:ctrlPr>
+                          <a:rPr lang="en-US" i="1" dirty="0">
+                            <a:latin typeface="Cambria Math" panose="02040503050406030204" pitchFamily="18" charset="0"/>
+                          </a:rPr>
+                        </m:ctrlPr>
+                      </m:sSubSupPr>
+                      <m:e>
+                        <m:r>
+                          <a:rPr lang="en-US" i="1" dirty="0">
+                            <a:latin typeface="Cambria Math" panose="02040503050406030204" pitchFamily="18" charset="0"/>
+                          </a:rPr>
+                          <m:t>𝑇</m:t>
+                        </m:r>
+                      </m:e>
+                      <m:sub>
+                        <m:r>
+                          <a:rPr lang="en-US" i="1" dirty="0">
+                            <a:latin typeface="Cambria Math" panose="02040503050406030204" pitchFamily="18" charset="0"/>
+                          </a:rPr>
+                          <m:t>𝑜𝑎</m:t>
+                        </m:r>
+                      </m:sub>
+                      <m:sup>
+                        <m:r>
                           <a:rPr lang="en-US" i="1" dirty="0">
                             <a:latin typeface="Cambria Math" panose="02040503050406030204" pitchFamily="18" charset="0"/>
                           </a:rPr>
@@ -7162,6 +7621,9 @@
                       <m:sSubPr>
                         <m:ctrlPr>
                           <a:rPr lang="en-US" i="1" dirty="0" smtClean="0">
+                            <a:solidFill>
+                              <a:srgbClr val="FF0000"/>
+                            </a:solidFill>
                             <a:latin typeface="Cambria Math" panose="02040503050406030204" pitchFamily="18" charset="0"/>
                           </a:rPr>
                         </m:ctrlPr>
@@ -7169,6 +7631,9 @@
                       <m:e>
                         <m:r>
                           <a:rPr lang="en-US" i="1" dirty="0">
+                            <a:solidFill>
+                              <a:srgbClr val="FF0000"/>
+                            </a:solidFill>
                             <a:latin typeface="Cambria Math" panose="02040503050406030204" pitchFamily="18" charset="0"/>
                           </a:rPr>
                           <m:t>𝑎</m:t>
@@ -7177,9 +7642,30 @@
                       <m:sub>
                         <m:r>
                           <a:rPr lang="en-US" i="1" dirty="0">
+                            <a:solidFill>
+                              <a:srgbClr val="FF0000"/>
+                            </a:solidFill>
                             <a:latin typeface="Cambria Math" panose="02040503050406030204" pitchFamily="18" charset="0"/>
                           </a:rPr>
                           <m:t>3</m:t>
+                        </m:r>
+                        <m:r>
+                          <a:rPr lang="en-US" b="0" i="1" dirty="0" smtClean="0">
+                            <a:solidFill>
+                              <a:srgbClr val="FF0000"/>
+                            </a:solidFill>
+                            <a:latin typeface="Cambria Math" panose="02040503050406030204" pitchFamily="18" charset="0"/>
+                          </a:rPr>
+                          <m:t>,</m:t>
+                        </m:r>
+                        <m:r>
+                          <a:rPr lang="en-US" b="0" i="1" dirty="0" smtClean="0">
+                            <a:solidFill>
+                              <a:srgbClr val="FF0000"/>
+                            </a:solidFill>
+                            <a:latin typeface="Cambria Math" panose="02040503050406030204" pitchFamily="18" charset="0"/>
+                          </a:rPr>
+                          <m:t>𝑧</m:t>
                         </m:r>
                       </m:sub>
                     </m:sSub>
@@ -7207,10 +7693,10 @@
                       </m:e>
                       <m:sub>
                         <m:r>
-                          <a:rPr lang="en-US" i="1" dirty="0">
-                            <a:latin typeface="Cambria Math" panose="02040503050406030204" pitchFamily="18" charset="0"/>
-                          </a:rPr>
-                          <m:t>𝑠𝑒𝑡</m:t>
+                          <a:rPr lang="en-US" b="0" i="1" dirty="0" smtClean="0">
+                            <a:latin typeface="Cambria Math" panose="02040503050406030204" pitchFamily="18" charset="0"/>
+                          </a:rPr>
+                          <m:t>𝑧</m:t>
                         </m:r>
                       </m:sub>
                       <m:sup>
@@ -7231,7 +7717,10 @@
                     <m:sSub>
                       <m:sSubPr>
                         <m:ctrlPr>
-                          <a:rPr lang="en-US" i="1" dirty="0">
+                          <a:rPr lang="en-US" i="1" dirty="0" smtClean="0">
+                            <a:solidFill>
+                              <a:srgbClr val="FF0000"/>
+                            </a:solidFill>
                             <a:latin typeface="Cambria Math" panose="02040503050406030204" pitchFamily="18" charset="0"/>
                           </a:rPr>
                         </m:ctrlPr>
@@ -7239,6 +7728,9 @@
                       <m:e>
                         <m:r>
                           <a:rPr lang="en-US" i="1" dirty="0">
+                            <a:solidFill>
+                              <a:srgbClr val="FF0000"/>
+                            </a:solidFill>
                             <a:latin typeface="Cambria Math" panose="02040503050406030204" pitchFamily="18" charset="0"/>
                           </a:rPr>
                           <m:t>𝑎</m:t>
@@ -7247,109 +7739,68 @@
                       <m:sub>
                         <m:r>
                           <a:rPr lang="en-US" i="1" dirty="0" smtClean="0">
+                            <a:solidFill>
+                              <a:srgbClr val="FF0000"/>
+                            </a:solidFill>
                             <a:latin typeface="Cambria Math" panose="02040503050406030204" pitchFamily="18" charset="0"/>
                           </a:rPr>
                           <m:t>4</m:t>
                         </m:r>
-                      </m:sub>
-                    </m:sSub>
-                  </m:oMath>
-                </a14:m>
-                <a:endParaRPr lang="en-US" i="1" dirty="0"/>
-              </a:p>
-              <a:p>
-                <a:pPr lvl="1"/>
-                <a:r>
-                  <a:rPr lang="en-US" dirty="0"/>
-                  <a:t>Fan power model  and chiller power model training:</a:t>
-                </a:r>
-              </a:p>
-              <a:p>
-                <a:pPr lvl="2"/>
-                <a:r>
-                  <a:rPr lang="en-US" dirty="0"/>
-                  <a:t>Obtain </a:t>
-                </a:r>
-                <a14:m>
-                  <m:oMath xmlns:m="http://schemas.openxmlformats.org/officeDocument/2006/math">
-                    <m:sSub>
-                      <m:sSubPr>
-                        <m:ctrlPr>
-                          <a:rPr lang="en-US" b="0" i="1" smtClean="0">
-                            <a:latin typeface="Cambria Math" panose="02040503050406030204" pitchFamily="18" charset="0"/>
-                          </a:rPr>
-                        </m:ctrlPr>
-                      </m:sSubPr>
-                      <m:e>
-                        <m:r>
-                          <a:rPr lang="en-US" b="0" i="1" smtClean="0">
-                            <a:latin typeface="Cambria Math" panose="02040503050406030204" pitchFamily="18" charset="0"/>
-                          </a:rPr>
-                          <m:t>𝑐</m:t>
-                        </m:r>
-                      </m:e>
-                      <m:sub>
-                        <m:r>
-                          <a:rPr lang="en-US" b="0" i="1" smtClean="0">
-                            <a:latin typeface="Cambria Math" panose="02040503050406030204" pitchFamily="18" charset="0"/>
-                          </a:rPr>
-                          <m:t>0</m:t>
-                        </m:r>
-                      </m:sub>
-                    </m:sSub>
-                    <m:r>
-                      <a:rPr lang="en-US" b="0" i="1" smtClean="0">
-                        <a:latin typeface="Cambria Math" panose="02040503050406030204" pitchFamily="18" charset="0"/>
-                      </a:rPr>
-                      <m:t>~</m:t>
-                    </m:r>
-                    <m:sSub>
-                      <m:sSubPr>
-                        <m:ctrlPr>
-                          <a:rPr lang="en-US" b="0" i="1" smtClean="0">
-                            <a:latin typeface="Cambria Math" panose="02040503050406030204" pitchFamily="18" charset="0"/>
-                          </a:rPr>
-                        </m:ctrlPr>
-                      </m:sSubPr>
-                      <m:e>
-                        <m:r>
-                          <a:rPr lang="en-US" b="0" i="1" smtClean="0">
-                            <a:latin typeface="Cambria Math" panose="02040503050406030204" pitchFamily="18" charset="0"/>
-                          </a:rPr>
-                          <m:t>𝑐</m:t>
-                        </m:r>
-                      </m:e>
-                      <m:sub>
-                        <m:r>
-                          <a:rPr lang="en-US" b="0" i="1" smtClean="0">
-                            <a:latin typeface="Cambria Math" panose="02040503050406030204" pitchFamily="18" charset="0"/>
-                          </a:rPr>
-                          <m:t>3</m:t>
+                        <m:r>
+                          <a:rPr lang="en-US" b="0" i="1" dirty="0" smtClean="0">
+                            <a:solidFill>
+                              <a:srgbClr val="FF0000"/>
+                            </a:solidFill>
+                            <a:latin typeface="Cambria Math" panose="02040503050406030204" pitchFamily="18" charset="0"/>
+                          </a:rPr>
+                          <m:t>,</m:t>
+                        </m:r>
+                        <m:r>
+                          <a:rPr lang="en-US" b="0" i="1" dirty="0" smtClean="0">
+                            <a:solidFill>
+                              <a:srgbClr val="FF0000"/>
+                            </a:solidFill>
+                            <a:latin typeface="Cambria Math" panose="02040503050406030204" pitchFamily="18" charset="0"/>
+                          </a:rPr>
+                          <m:t>𝑧</m:t>
                         </m:r>
                       </m:sub>
                     </m:sSub>
                   </m:oMath>
                 </a14:m>
                 <a:r>
+                  <a:rPr lang="en-US" i="1" dirty="0"/>
+                  <a:t> </a:t>
+                </a:r>
+                <a:r>
                   <a:rPr lang="en-US" dirty="0"/>
-                  <a:t> and </a:t>
+                  <a:t>, 	for t=2,3,…,K</a:t>
+                </a:r>
+              </a:p>
+              <a:p>
+                <a:pPr marL="457200" lvl="1" indent="0">
+                  <a:buNone/>
+                </a:pPr>
+                <a:r>
+                  <a:rPr lang="en-US" dirty="0"/>
+                  <a:t>Where </a:t>
                 </a:r>
                 <a14:m>
                   <m:oMath xmlns:m="http://schemas.openxmlformats.org/officeDocument/2006/math">
-                    <m:sSub>
-                      <m:sSubPr>
+                    <m:sSubSup>
+                      <m:sSubSupPr>
                         <m:ctrlPr>
                           <a:rPr lang="en-US" i="1" dirty="0">
                             <a:latin typeface="Cambria Math" panose="02040503050406030204" pitchFamily="18" charset="0"/>
                           </a:rPr>
                         </m:ctrlPr>
-                      </m:sSubPr>
+                      </m:sSubSupPr>
                       <m:e>
                         <m:r>
                           <a:rPr lang="en-US" i="1" dirty="0">
                             <a:latin typeface="Cambria Math" panose="02040503050406030204" pitchFamily="18" charset="0"/>
                           </a:rPr>
-                          <m:t>𝜂</m:t>
+                          <m:t>𝑇</m:t>
                         </m:r>
                       </m:e>
                       <m:sub>
@@ -7357,32 +7808,40 @@
                           <a:rPr lang="en-US" i="1" dirty="0">
                             <a:latin typeface="Cambria Math" panose="02040503050406030204" pitchFamily="18" charset="0"/>
                           </a:rPr>
-                          <m:t>𝐶𝑂𝑃</m:t>
+                          <m:t>𝑧</m:t>
                         </m:r>
                       </m:sub>
-                    </m:sSub>
+                      <m:sup>
+                        <m:r>
+                          <a:rPr lang="en-US" i="1" dirty="0">
+                            <a:latin typeface="Cambria Math" panose="02040503050406030204" pitchFamily="18" charset="0"/>
+                          </a:rPr>
+                          <m:t>0</m:t>
+                        </m:r>
+                      </m:sup>
+                    </m:sSubSup>
                   </m:oMath>
                 </a14:m>
                 <a:r>
                   <a:rPr lang="en-US" dirty="0"/>
-                  <a:t> (</a:t>
+                  <a:t> is the initial zone temperature, </a:t>
                 </a:r>
                 <a14:m>
                   <m:oMath xmlns:m="http://schemas.openxmlformats.org/officeDocument/2006/math">
-                    <m:sSub>
-                      <m:sSubPr>
+                    <m:sSubSup>
+                      <m:sSubSupPr>
                         <m:ctrlPr>
                           <a:rPr lang="en-US" i="1" dirty="0">
                             <a:latin typeface="Cambria Math" panose="02040503050406030204" pitchFamily="18" charset="0"/>
                           </a:rPr>
                         </m:ctrlPr>
-                      </m:sSubPr>
+                      </m:sSubSupPr>
                       <m:e>
                         <m:r>
                           <a:rPr lang="en-US" i="1" dirty="0">
                             <a:latin typeface="Cambria Math" panose="02040503050406030204" pitchFamily="18" charset="0"/>
                           </a:rPr>
-                          <m:t>𝑐</m:t>
+                          <m:t>𝑇</m:t>
                         </m:r>
                       </m:e>
                       <m:sub>
@@ -7390,94 +7849,29 @@
                           <a:rPr lang="en-US" i="1" dirty="0">
                             <a:latin typeface="Cambria Math" panose="02040503050406030204" pitchFamily="18" charset="0"/>
                           </a:rPr>
-                          <m:t>𝑝</m:t>
+                          <m:t>𝑧</m:t>
                         </m:r>
                       </m:sub>
-                    </m:sSub>
+                      <m:sup>
+                        <m:r>
+                          <a:rPr lang="en-US" i="1" dirty="0">
+                            <a:latin typeface="Cambria Math" panose="02040503050406030204" pitchFamily="18" charset="0"/>
+                          </a:rPr>
+                          <m:t>𝑡</m:t>
+                        </m:r>
+                      </m:sup>
+                    </m:sSubSup>
                   </m:oMath>
                 </a14:m>
                 <a:r>
                   <a:rPr lang="en-US" dirty="0"/>
-                  <a:t> is known, </a:t>
+                  <a:t> are the zone cooling setpoints temperatures.</a:t>
                 </a:r>
-                <a14:m>
-                  <m:oMath xmlns:m="http://schemas.openxmlformats.org/officeDocument/2006/math">
-                    <m:sSub>
-                      <m:sSubPr>
-                        <m:ctrlPr>
-                          <a:rPr lang="en-US" b="0" i="1" smtClean="0">
-                            <a:latin typeface="Cambria Math" panose="02040503050406030204" pitchFamily="18" charset="0"/>
-                          </a:rPr>
-                        </m:ctrlPr>
-                      </m:sSubPr>
-                      <m:e>
-                        <m:r>
-                          <a:rPr lang="en-US" b="0" i="1" smtClean="0">
-                            <a:latin typeface="Cambria Math" panose="02040503050406030204" pitchFamily="18" charset="0"/>
-                          </a:rPr>
-                          <m:t>𝑇</m:t>
-                        </m:r>
-                      </m:e>
-                      <m:sub>
-                        <m:r>
-                          <a:rPr lang="en-US" b="0" i="1" smtClean="0">
-                            <a:latin typeface="Cambria Math" panose="02040503050406030204" pitchFamily="18" charset="0"/>
-                          </a:rPr>
-                          <m:t>𝑑𝑖𝑠</m:t>
-                        </m:r>
-                      </m:sub>
-                    </m:sSub>
-                    <m:r>
-                      <a:rPr lang="en-US" b="0" i="1" smtClean="0">
-                        <a:latin typeface="Cambria Math" panose="02040503050406030204" pitchFamily="18" charset="0"/>
-                      </a:rPr>
-                      <m:t>=12.8 </m:t>
-                    </m:r>
-                    <m:r>
-                      <a:rPr lang="en-US" b="0" i="1" smtClean="0">
-                        <a:latin typeface="Cambria Math" panose="02040503050406030204" pitchFamily="18" charset="0"/>
-                        <a:ea typeface="Cambria Math" panose="02040503050406030204" pitchFamily="18" charset="0"/>
-                      </a:rPr>
-                      <m:t>℃</m:t>
-                    </m:r>
-                  </m:oMath>
-                </a14:m>
-                <a:r>
-                  <a:rPr lang="en-US" dirty="0"/>
-                  <a:t>), limits of </a:t>
-                </a:r>
-                <a:r>
-                  <a:rPr lang="en-US" dirty="0" err="1"/>
-                  <a:t>Tset</a:t>
-                </a:r>
-                <a:r>
-                  <a:rPr lang="en-US" dirty="0"/>
-                  <a:t>, </a:t>
-                </a:r>
-                <a14:m>
-                  <m:oMath xmlns:m="http://schemas.openxmlformats.org/officeDocument/2006/math">
-                    <m:r>
-                      <a:rPr lang="en-US" i="1">
-                        <a:latin typeface="Cambria Math" panose="02040503050406030204" pitchFamily="18" charset="0"/>
-                      </a:rPr>
-                      <m:t>𝛿</m:t>
-                    </m:r>
-                  </m:oMath>
-                </a14:m>
-                <a:r>
-                  <a:rPr lang="en-US" i="1" dirty="0"/>
-                  <a:t>, </a:t>
-                </a:r>
-                <a:r>
-                  <a:rPr lang="en-US" i="1" dirty="0" err="1"/>
-                  <a:t>Tdis</a:t>
-                </a:r>
-                <a:endParaRPr lang="en-US" i="1" dirty="0"/>
               </a:p>
               <a:p>
                 <a:r>
                   <a:rPr lang="en-US" dirty="0"/>
-                  <a:t>Power constraints</a:t>
+                  <a:t>Fan power model  and chiller power model training:</a:t>
                 </a:r>
               </a:p>
               <a:p>
@@ -7558,7 +7952,10 @@
                     <m:sSub>
                       <m:sSubPr>
                         <m:ctrlPr>
-                          <a:rPr lang="en-US" i="1" dirty="0">
+                          <a:rPr lang="en-US" i="1" dirty="0" smtClean="0">
+                            <a:solidFill>
+                              <a:srgbClr val="FF0000"/>
+                            </a:solidFill>
                             <a:latin typeface="Cambria Math" panose="02040503050406030204" pitchFamily="18" charset="0"/>
                           </a:rPr>
                         </m:ctrlPr>
@@ -7566,6 +7963,9 @@
                       <m:e>
                         <m:r>
                           <a:rPr lang="en-US" i="1" dirty="0">
+                            <a:solidFill>
+                              <a:srgbClr val="FF0000"/>
+                            </a:solidFill>
                             <a:latin typeface="Cambria Math" panose="02040503050406030204" pitchFamily="18" charset="0"/>
                           </a:rPr>
                           <m:t>𝑐</m:t>
@@ -7574,9 +7974,30 @@
                       <m:sub>
                         <m:r>
                           <a:rPr lang="en-US" i="1" dirty="0">
+                            <a:solidFill>
+                              <a:srgbClr val="FF0000"/>
+                            </a:solidFill>
                             <a:latin typeface="Cambria Math" panose="02040503050406030204" pitchFamily="18" charset="0"/>
                           </a:rPr>
                           <m:t>1</m:t>
+                        </m:r>
+                        <m:r>
+                          <a:rPr lang="en-US" b="0" i="1" dirty="0" smtClean="0">
+                            <a:solidFill>
+                              <a:srgbClr val="FF0000"/>
+                            </a:solidFill>
+                            <a:latin typeface="Cambria Math" panose="02040503050406030204" pitchFamily="18" charset="0"/>
+                          </a:rPr>
+                          <m:t>,</m:t>
+                        </m:r>
+                        <m:r>
+                          <a:rPr lang="en-US" b="0" i="1" dirty="0" smtClean="0">
+                            <a:solidFill>
+                              <a:srgbClr val="FF0000"/>
+                            </a:solidFill>
+                            <a:latin typeface="Cambria Math" panose="02040503050406030204" pitchFamily="18" charset="0"/>
+                          </a:rPr>
+                          <m:t>𝑓</m:t>
                         </m:r>
                       </m:sub>
                     </m:sSub>
@@ -7652,7 +8073,10 @@
                     <m:sSub>
                       <m:sSubPr>
                         <m:ctrlPr>
-                          <a:rPr lang="en-US" i="1" dirty="0">
+                          <a:rPr lang="en-US" i="1" dirty="0" smtClean="0">
+                            <a:solidFill>
+                              <a:srgbClr val="FF0000"/>
+                            </a:solidFill>
                             <a:latin typeface="Cambria Math" panose="02040503050406030204" pitchFamily="18" charset="0"/>
                           </a:rPr>
                         </m:ctrlPr>
@@ -7660,6 +8084,9 @@
                       <m:e>
                         <m:r>
                           <a:rPr lang="en-US" i="1" dirty="0">
+                            <a:solidFill>
+                              <a:srgbClr val="FF0000"/>
+                            </a:solidFill>
                             <a:latin typeface="Cambria Math" panose="02040503050406030204" pitchFamily="18" charset="0"/>
                           </a:rPr>
                           <m:t>𝑐</m:t>
@@ -7668,9 +8095,30 @@
                       <m:sub>
                         <m:r>
                           <a:rPr lang="en-US" i="1" dirty="0">
+                            <a:solidFill>
+                              <a:srgbClr val="FF0000"/>
+                            </a:solidFill>
                             <a:latin typeface="Cambria Math" panose="02040503050406030204" pitchFamily="18" charset="0"/>
                           </a:rPr>
                           <m:t>2</m:t>
+                        </m:r>
+                        <m:r>
+                          <a:rPr lang="en-US" b="0" i="1" dirty="0" smtClean="0">
+                            <a:solidFill>
+                              <a:srgbClr val="FF0000"/>
+                            </a:solidFill>
+                            <a:latin typeface="Cambria Math" panose="02040503050406030204" pitchFamily="18" charset="0"/>
+                          </a:rPr>
+                          <m:t>,</m:t>
+                        </m:r>
+                        <m:r>
+                          <a:rPr lang="en-US" b="0" i="1" dirty="0" smtClean="0">
+                            <a:solidFill>
+                              <a:srgbClr val="FF0000"/>
+                            </a:solidFill>
+                            <a:latin typeface="Cambria Math" panose="02040503050406030204" pitchFamily="18" charset="0"/>
+                          </a:rPr>
+                          <m:t>𝑓</m:t>
                         </m:r>
                       </m:sub>
                     </m:sSub>
@@ -7777,7 +8225,10 @@
                     <m:sSub>
                       <m:sSubPr>
                         <m:ctrlPr>
-                          <a:rPr lang="en-US" i="1" dirty="0">
+                          <a:rPr lang="en-US" i="1" dirty="0" smtClean="0">
+                            <a:solidFill>
+                              <a:srgbClr val="FF0000"/>
+                            </a:solidFill>
                             <a:latin typeface="Cambria Math" panose="02040503050406030204" pitchFamily="18" charset="0"/>
                           </a:rPr>
                         </m:ctrlPr>
@@ -7785,6 +8236,9 @@
                       <m:e>
                         <m:r>
                           <a:rPr lang="en-US" i="1" dirty="0">
+                            <a:solidFill>
+                              <a:srgbClr val="FF0000"/>
+                            </a:solidFill>
                             <a:latin typeface="Cambria Math" panose="02040503050406030204" pitchFamily="18" charset="0"/>
                           </a:rPr>
                           <m:t>𝑐</m:t>
@@ -7793,9 +8247,30 @@
                       <m:sub>
                         <m:r>
                           <a:rPr lang="en-US" i="1" dirty="0">
+                            <a:solidFill>
+                              <a:srgbClr val="FF0000"/>
+                            </a:solidFill>
                             <a:latin typeface="Cambria Math" panose="02040503050406030204" pitchFamily="18" charset="0"/>
                           </a:rPr>
                           <m:t>3</m:t>
+                        </m:r>
+                        <m:r>
+                          <a:rPr lang="en-US" b="0" i="1" dirty="0" smtClean="0">
+                            <a:solidFill>
+                              <a:srgbClr val="FF0000"/>
+                            </a:solidFill>
+                            <a:latin typeface="Cambria Math" panose="02040503050406030204" pitchFamily="18" charset="0"/>
+                          </a:rPr>
+                          <m:t>,</m:t>
+                        </m:r>
+                        <m:r>
+                          <a:rPr lang="en-US" b="0" i="1" dirty="0" smtClean="0">
+                            <a:solidFill>
+                              <a:srgbClr val="FF0000"/>
+                            </a:solidFill>
+                            <a:latin typeface="Cambria Math" panose="02040503050406030204" pitchFamily="18" charset="0"/>
+                          </a:rPr>
+                          <m:t>𝑓</m:t>
                         </m:r>
                       </m:sub>
                     </m:sSub>
@@ -7902,7 +8377,10 @@
                     <m:sSub>
                       <m:sSubPr>
                         <m:ctrlPr>
-                          <a:rPr lang="en-US" i="1" dirty="0">
+                          <a:rPr lang="en-US" i="1" dirty="0" smtClean="0">
+                            <a:solidFill>
+                              <a:srgbClr val="FF0000"/>
+                            </a:solidFill>
                             <a:latin typeface="Cambria Math" panose="02040503050406030204" pitchFamily="18" charset="0"/>
                           </a:rPr>
                         </m:ctrlPr>
@@ -7910,6 +8388,9 @@
                       <m:e>
                         <m:r>
                           <a:rPr lang="en-US" i="1" dirty="0">
+                            <a:solidFill>
+                              <a:srgbClr val="FF0000"/>
+                            </a:solidFill>
                             <a:latin typeface="Cambria Math" panose="02040503050406030204" pitchFamily="18" charset="0"/>
                           </a:rPr>
                           <m:t>𝑐</m:t>
@@ -7917,10 +8398,22 @@
                       </m:e>
                       <m:sub>
                         <m:r>
-                          <a:rPr lang="en-US" i="1" dirty="0">
-                            <a:latin typeface="Cambria Math" panose="02040503050406030204" pitchFamily="18" charset="0"/>
-                          </a:rPr>
-                          <m:t>0</m:t>
+                          <a:rPr lang="en-US" b="0" i="1" dirty="0" smtClean="0">
+                            <a:solidFill>
+                              <a:srgbClr val="FF0000"/>
+                            </a:solidFill>
+                            <a:latin typeface="Cambria Math" panose="02040503050406030204" pitchFamily="18" charset="0"/>
+                          </a:rPr>
+                          <m:t>4,</m:t>
+                        </m:r>
+                        <m:r>
+                          <a:rPr lang="en-US" b="0" i="1" dirty="0" smtClean="0">
+                            <a:solidFill>
+                              <a:srgbClr val="FF0000"/>
+                            </a:solidFill>
+                            <a:latin typeface="Cambria Math" panose="02040503050406030204" pitchFamily="18" charset="0"/>
+                          </a:rPr>
+                          <m:t>𝑓</m:t>
                         </m:r>
                       </m:sub>
                     </m:sSub>
@@ -7971,19 +8464,48 @@
                       </a:rPr>
                       <m:t>= </m:t>
                     </m:r>
-                    <m:f>
-                      <m:fPr>
+                    <m:nary>
+                      <m:naryPr>
+                        <m:chr m:val="∑"/>
                         <m:ctrlPr>
-                          <a:rPr lang="en-US" i="1" dirty="0">
+                          <a:rPr lang="en-US" i="1" dirty="0" smtClean="0">
                             <a:latin typeface="Cambria Math" panose="02040503050406030204" pitchFamily="18" charset="0"/>
                           </a:rPr>
                         </m:ctrlPr>
-                      </m:fPr>
-                      <m:num>
+                      </m:naryPr>
+                      <m:sub>
+                        <m:r>
+                          <m:rPr>
+                            <m:brk m:alnAt="23"/>
+                          </m:rPr>
+                          <a:rPr lang="en-US" b="0" i="1" dirty="0" smtClean="0">
+                            <a:latin typeface="Cambria Math" panose="02040503050406030204" pitchFamily="18" charset="0"/>
+                          </a:rPr>
+                          <m:t>𝑓</m:t>
+                        </m:r>
+                        <m:r>
+                          <a:rPr lang="en-US" b="0" i="1" dirty="0" smtClean="0">
+                            <a:latin typeface="Cambria Math" panose="02040503050406030204" pitchFamily="18" charset="0"/>
+                          </a:rPr>
+                          <m:t>=1</m:t>
+                        </m:r>
+                      </m:sub>
+                      <m:sup>
+                        <m:r>
+                          <a:rPr lang="en-US" b="0" i="1" dirty="0" smtClean="0">
+                            <a:latin typeface="Cambria Math" panose="02040503050406030204" pitchFamily="18" charset="0"/>
+                          </a:rPr>
+                          <m:t>𝑁</m:t>
+                        </m:r>
+                      </m:sup>
+                      <m:e>
                         <m:sSub>
                           <m:sSubPr>
                             <m:ctrlPr>
-                              <a:rPr lang="en-US" i="1" dirty="0">
+                              <a:rPr lang="en-US" i="1" dirty="0" smtClean="0">
+                                <a:solidFill>
+                                  <a:srgbClr val="FF0000"/>
+                                </a:solidFill>
                                 <a:latin typeface="Cambria Math" panose="02040503050406030204" pitchFamily="18" charset="0"/>
                               </a:rPr>
                             </m:ctrlPr>
@@ -7991,84 +8513,27 @@
                           <m:e>
                             <m:r>
                               <a:rPr lang="en-US" i="1" dirty="0">
+                                <a:solidFill>
+                                  <a:srgbClr val="FF0000"/>
+                                </a:solidFill>
                                 <a:latin typeface="Cambria Math" panose="02040503050406030204" pitchFamily="18" charset="0"/>
+                                <a:ea typeface="Cambria Math" panose="02040503050406030204" pitchFamily="18" charset="0"/>
                               </a:rPr>
-                              <m:t>𝑐</m:t>
+                              <m:t>𝜀</m:t>
                             </m:r>
                           </m:e>
                           <m:sub>
                             <m:r>
-                              <a:rPr lang="en-US" i="1" dirty="0">
+                              <a:rPr lang="en-US" b="0" i="1" dirty="0" smtClean="0">
+                                <a:solidFill>
+                                  <a:srgbClr val="FF0000"/>
+                                </a:solidFill>
                                 <a:latin typeface="Cambria Math" panose="02040503050406030204" pitchFamily="18" charset="0"/>
                               </a:rPr>
-                              <m:t>𝑝</m:t>
+                              <m:t>𝑓</m:t>
                             </m:r>
                           </m:sub>
                         </m:sSub>
-                      </m:num>
-                      <m:den>
-                        <m:sSub>
-                          <m:sSubPr>
-                            <m:ctrlPr>
-                              <a:rPr lang="en-US" i="1" dirty="0">
-                                <a:latin typeface="Cambria Math" panose="02040503050406030204" pitchFamily="18" charset="0"/>
-                              </a:rPr>
-                            </m:ctrlPr>
-                          </m:sSubPr>
-                          <m:e>
-                            <m:r>
-                              <a:rPr lang="en-US" i="1" dirty="0">
-                                <a:latin typeface="Cambria Math" panose="02040503050406030204" pitchFamily="18" charset="0"/>
-                              </a:rPr>
-                              <m:t>𝜂</m:t>
-                            </m:r>
-                          </m:e>
-                          <m:sub>
-                            <m:r>
-                              <a:rPr lang="en-US" i="1" dirty="0">
-                                <a:latin typeface="Cambria Math" panose="02040503050406030204" pitchFamily="18" charset="0"/>
-                              </a:rPr>
-                              <m:t>𝐶𝑂𝑃</m:t>
-                            </m:r>
-                          </m:sub>
-                        </m:sSub>
-                      </m:den>
-                    </m:f>
-                    <m:nary>
-                      <m:naryPr>
-                        <m:chr m:val="∑"/>
-                        <m:ctrlPr>
-                          <a:rPr lang="en-US" i="1" dirty="0" smtClean="0">
-                            <a:latin typeface="Cambria Math" panose="02040503050406030204" pitchFamily="18" charset="0"/>
-                          </a:rPr>
-                        </m:ctrlPr>
-                      </m:naryPr>
-                      <m:sub>
-                        <m:r>
-                          <m:rPr>
-                            <m:brk m:alnAt="23"/>
-                          </m:rPr>
-                          <a:rPr lang="en-US" b="0" i="1" dirty="0" smtClean="0">
-                            <a:latin typeface="Cambria Math" panose="02040503050406030204" pitchFamily="18" charset="0"/>
-                          </a:rPr>
-                          <m:t>𝑓</m:t>
-                        </m:r>
-                        <m:r>
-                          <a:rPr lang="en-US" b="0" i="1" dirty="0" smtClean="0">
-                            <a:latin typeface="Cambria Math" panose="02040503050406030204" pitchFamily="18" charset="0"/>
-                          </a:rPr>
-                          <m:t>=1</m:t>
-                        </m:r>
-                      </m:sub>
-                      <m:sup>
-                        <m:r>
-                          <a:rPr lang="en-US" b="0" i="1" dirty="0" smtClean="0">
-                            <a:latin typeface="Cambria Math" panose="02040503050406030204" pitchFamily="18" charset="0"/>
-                          </a:rPr>
-                          <m:t>𝑁</m:t>
-                        </m:r>
-                      </m:sup>
-                      <m:e>
                         <m:sSubSup>
                           <m:sSubSupPr>
                             <m:ctrlPr>
@@ -8155,6 +8620,18 @@
                               </a:rPr>
                               <m:t>𝑚𝑖𝑥</m:t>
                             </m:r>
+                            <m:r>
+                              <a:rPr lang="en-US" b="0" i="1" dirty="0" smtClean="0">
+                                <a:latin typeface="Cambria Math" panose="02040503050406030204" pitchFamily="18" charset="0"/>
+                              </a:rPr>
+                              <m:t>,</m:t>
+                            </m:r>
+                            <m:r>
+                              <a:rPr lang="en-US" b="0" i="1" dirty="0" smtClean="0">
+                                <a:latin typeface="Cambria Math" panose="02040503050406030204" pitchFamily="18" charset="0"/>
+                              </a:rPr>
+                              <m:t>𝑓</m:t>
+                            </m:r>
                           </m:sub>
                           <m:sup>
                             <m:r>
@@ -8189,10 +8666,22 @@
                           </m:e>
                           <m:sub>
                             <m:r>
-                              <a:rPr lang="en-US" i="1" dirty="0">
+                              <a:rPr lang="en-US" b="0" i="1" dirty="0" smtClean="0">
                                 <a:latin typeface="Cambria Math" panose="02040503050406030204" pitchFamily="18" charset="0"/>
                               </a:rPr>
-                              <m:t>𝑑𝑖𝑠</m:t>
+                              <m:t>𝑐</m:t>
+                            </m:r>
+                            <m:r>
+                              <a:rPr lang="en-US" b="0" i="1" dirty="0" smtClean="0">
+                                <a:latin typeface="Cambria Math" panose="02040503050406030204" pitchFamily="18" charset="0"/>
+                              </a:rPr>
+                              <m:t>,</m:t>
+                            </m:r>
+                            <m:r>
+                              <a:rPr lang="en-US" b="0" i="1" dirty="0" smtClean="0">
+                                <a:latin typeface="Cambria Math" panose="02040503050406030204" pitchFamily="18" charset="0"/>
+                              </a:rPr>
+                              <m:t>𝑓</m:t>
                             </m:r>
                           </m:sub>
                         </m:sSub>
@@ -8238,6 +8727,18 @@
                             <a:latin typeface="Cambria Math" panose="02040503050406030204" pitchFamily="18" charset="0"/>
                           </a:rPr>
                           <m:t>𝑚𝑖𝑥</m:t>
+                        </m:r>
+                        <m:r>
+                          <a:rPr lang="en-US" b="0" i="1" smtClean="0">
+                            <a:latin typeface="Cambria Math" panose="02040503050406030204" pitchFamily="18" charset="0"/>
+                          </a:rPr>
+                          <m:t>,</m:t>
+                        </m:r>
+                        <m:r>
+                          <a:rPr lang="en-US" b="0" i="1" smtClean="0">
+                            <a:latin typeface="Cambria Math" panose="02040503050406030204" pitchFamily="18" charset="0"/>
+                          </a:rPr>
+                          <m:t>𝑓</m:t>
                         </m:r>
                       </m:sub>
                       <m:sup>
@@ -8289,6 +8790,20 @@
                                 <a:latin typeface="Cambria Math" panose="02040503050406030204" pitchFamily="18" charset="0"/>
                               </a:rPr>
                               <m:t>𝑧</m:t>
+                            </m:r>
+                            <m:r>
+                              <a:rPr lang="en-US" i="1" smtClean="0">
+                                <a:latin typeface="Cambria Math" panose="02040503050406030204" pitchFamily="18" charset="0"/>
+                                <a:ea typeface="Cambria Math" panose="02040503050406030204" pitchFamily="18" charset="0"/>
+                              </a:rPr>
+                              <m:t>∈</m:t>
+                            </m:r>
+                            <m:r>
+                              <a:rPr lang="en-US" b="0" i="1" smtClean="0">
+                                <a:latin typeface="Cambria Math" panose="02040503050406030204" pitchFamily="18" charset="0"/>
+                                <a:ea typeface="Cambria Math" panose="02040503050406030204" pitchFamily="18" charset="0"/>
+                              </a:rPr>
+                              <m:t>𝑓</m:t>
                             </m:r>
                           </m:sub>
                           <m:sup/>
@@ -8414,6 +8929,18 @@
                               </a:rPr>
                               <m:t>𝑡𝑜𝑡</m:t>
                             </m:r>
+                            <m:r>
+                              <a:rPr lang="en-US" b="0" i="1" dirty="0" smtClean="0">
+                                <a:latin typeface="Cambria Math" panose="02040503050406030204" pitchFamily="18" charset="0"/>
+                              </a:rPr>
+                              <m:t>,</m:t>
+                            </m:r>
+                            <m:r>
+                              <a:rPr lang="en-US" b="0" i="1" dirty="0" smtClean="0">
+                                <a:latin typeface="Cambria Math" panose="02040503050406030204" pitchFamily="18" charset="0"/>
+                              </a:rPr>
+                              <m:t>𝑓</m:t>
+                            </m:r>
                           </m:sub>
                           <m:sup>
                             <m:r>
@@ -8531,6 +9058,18 @@
                           </a:rPr>
                           <m:t>𝑡𝑜𝑡</m:t>
                         </m:r>
+                        <m:r>
+                          <a:rPr lang="en-US" b="0" i="1" dirty="0" smtClean="0">
+                            <a:latin typeface="Cambria Math" panose="02040503050406030204" pitchFamily="18" charset="0"/>
+                          </a:rPr>
+                          <m:t>,</m:t>
+                        </m:r>
+                        <m:r>
+                          <a:rPr lang="en-US" b="0" i="1" dirty="0" smtClean="0">
+                            <a:latin typeface="Cambria Math" panose="02040503050406030204" pitchFamily="18" charset="0"/>
+                          </a:rPr>
+                          <m:t>𝑓</m:t>
+                        </m:r>
                       </m:sub>
                       <m:sup>
                         <m:r>
@@ -8568,6 +9107,20 @@
                             <a:latin typeface="Cambria Math" panose="02040503050406030204" pitchFamily="18" charset="0"/>
                           </a:rPr>
                           <m:t>𝑧</m:t>
+                        </m:r>
+                        <m:r>
+                          <a:rPr lang="en-US" i="1" smtClean="0">
+                            <a:latin typeface="Cambria Math" panose="02040503050406030204" pitchFamily="18" charset="0"/>
+                            <a:ea typeface="Cambria Math" panose="02040503050406030204" pitchFamily="18" charset="0"/>
+                          </a:rPr>
+                          <m:t>∈</m:t>
+                        </m:r>
+                        <m:r>
+                          <a:rPr lang="en-US" b="0" i="1" smtClean="0">
+                            <a:latin typeface="Cambria Math" panose="02040503050406030204" pitchFamily="18" charset="0"/>
+                            <a:ea typeface="Cambria Math" panose="02040503050406030204" pitchFamily="18" charset="0"/>
+                          </a:rPr>
+                          <m:t>𝑓</m:t>
                         </m:r>
                       </m:sub>
                       <m:sup/>
@@ -8629,22 +9182,21 @@
                   <a:rPr lang="en-US" i="1" dirty="0"/>
                   <a:t> </a:t>
                 </a:r>
-              </a:p>
-              <a:p>
-                <a:pPr lvl="1"/>
                 <a:endParaRPr lang="en-US" dirty="0"/>
               </a:p>
               <a:p>
                 <a:r>
                   <a:rPr lang="en-US" dirty="0"/>
-                  <a:t>Objective </a:t>
+                  <a:t>Objective:</a:t>
                 </a:r>
               </a:p>
               <a:p>
-                <a:pPr lvl="1"/>
+                <a:pPr marL="457200" lvl="1" indent="0">
+                  <a:buNone/>
+                </a:pPr>
                 <a:r>
                   <a:rPr lang="en-US" dirty="0"/>
-                  <a:t>Minimize </a:t>
+                  <a:t>				Minimize </a:t>
                 </a:r>
                 <a14:m>
                   <m:oMath xmlns:m="http://schemas.openxmlformats.org/officeDocument/2006/math">
@@ -8665,7 +9217,7 @@
                           <a:rPr lang="en-US" b="0" i="1" dirty="0" smtClean="0">
                             <a:latin typeface="Cambria Math" panose="02040503050406030204" pitchFamily="18" charset="0"/>
                           </a:rPr>
-                          <m:t>𝑓</m:t>
+                          <m:t>𝑡</m:t>
                         </m:r>
                         <m:r>
                           <a:rPr lang="en-US" b="0" i="1" dirty="0" smtClean="0">
@@ -8679,10 +9231,104 @@
                           <a:rPr lang="en-US" b="0" i="1" dirty="0" smtClean="0">
                             <a:latin typeface="Cambria Math" panose="02040503050406030204" pitchFamily="18" charset="0"/>
                           </a:rPr>
-                          <m:t>𝑁</m:t>
+                          <m:t>𝐾</m:t>
                         </m:r>
                       </m:sup>
                       <m:e>
+                        <m:r>
+                          <a:rPr lang="en-US" b="0" i="1" dirty="0" smtClean="0">
+                            <a:latin typeface="Cambria Math" panose="02040503050406030204" pitchFamily="18" charset="0"/>
+                          </a:rPr>
+                          <m:t>(</m:t>
+                        </m:r>
+                        <m:nary>
+                          <m:naryPr>
+                            <m:chr m:val="∑"/>
+                            <m:ctrlPr>
+                              <a:rPr lang="en-US" i="1" dirty="0">
+                                <a:latin typeface="Cambria Math" panose="02040503050406030204" pitchFamily="18" charset="0"/>
+                              </a:rPr>
+                            </m:ctrlPr>
+                          </m:naryPr>
+                          <m:sub>
+                            <m:r>
+                              <m:rPr>
+                                <m:brk m:alnAt="23"/>
+                              </m:rPr>
+                              <a:rPr lang="en-US" i="1" dirty="0">
+                                <a:latin typeface="Cambria Math" panose="02040503050406030204" pitchFamily="18" charset="0"/>
+                              </a:rPr>
+                              <m:t>𝑓</m:t>
+                            </m:r>
+                            <m:r>
+                              <a:rPr lang="en-US" i="1" dirty="0">
+                                <a:latin typeface="Cambria Math" panose="02040503050406030204" pitchFamily="18" charset="0"/>
+                              </a:rPr>
+                              <m:t>=1</m:t>
+                            </m:r>
+                          </m:sub>
+                          <m:sup>
+                            <m:r>
+                              <a:rPr lang="en-US" i="1" dirty="0">
+                                <a:latin typeface="Cambria Math" panose="02040503050406030204" pitchFamily="18" charset="0"/>
+                              </a:rPr>
+                              <m:t>𝑁</m:t>
+                            </m:r>
+                          </m:sup>
+                          <m:e>
+                            <m:sSubSup>
+                              <m:sSubSupPr>
+                                <m:ctrlPr>
+                                  <a:rPr lang="en-US" i="1" dirty="0">
+                                    <a:latin typeface="Cambria Math" panose="02040503050406030204" pitchFamily="18" charset="0"/>
+                                  </a:rPr>
+                                </m:ctrlPr>
+                              </m:sSubSupPr>
+                              <m:e>
+                                <m:r>
+                                  <a:rPr lang="en-US" i="1" dirty="0">
+                                    <a:latin typeface="Cambria Math" panose="02040503050406030204" pitchFamily="18" charset="0"/>
+                                  </a:rPr>
+                                  <m:t>𝑃</m:t>
+                                </m:r>
+                              </m:e>
+                              <m:sub>
+                                <m:r>
+                                  <a:rPr lang="en-US" i="1" dirty="0">
+                                    <a:latin typeface="Cambria Math" panose="02040503050406030204" pitchFamily="18" charset="0"/>
+                                  </a:rPr>
+                                  <m:t>𝑓𝑎𝑛</m:t>
+                                </m:r>
+                                <m:r>
+                                  <a:rPr lang="en-US" i="1" dirty="0">
+                                    <a:latin typeface="Cambria Math" panose="02040503050406030204" pitchFamily="18" charset="0"/>
+                                  </a:rPr>
+                                  <m:t>,</m:t>
+                                </m:r>
+                                <m:r>
+                                  <a:rPr lang="en-US" i="1" dirty="0">
+                                    <a:latin typeface="Cambria Math" panose="02040503050406030204" pitchFamily="18" charset="0"/>
+                                  </a:rPr>
+                                  <m:t>𝑓</m:t>
+                                </m:r>
+                              </m:sub>
+                              <m:sup>
+                                <m:r>
+                                  <a:rPr lang="en-US" i="1" dirty="0">
+                                    <a:latin typeface="Cambria Math" panose="02040503050406030204" pitchFamily="18" charset="0"/>
+                                  </a:rPr>
+                                  <m:t>𝑡</m:t>
+                                </m:r>
+                              </m:sup>
+                            </m:sSubSup>
+                          </m:e>
+                        </m:nary>
+                        <m:r>
+                          <a:rPr lang="en-US" i="1" dirty="0">
+                            <a:latin typeface="Cambria Math" panose="02040503050406030204" pitchFamily="18" charset="0"/>
+                          </a:rPr>
+                          <m:t>+</m:t>
+                        </m:r>
                         <m:sSubSup>
                           <m:sSubSupPr>
                             <m:ctrlPr>
@@ -8704,19 +9350,7 @@
                               <a:rPr lang="en-US" i="1" dirty="0">
                                 <a:latin typeface="Cambria Math" panose="02040503050406030204" pitchFamily="18" charset="0"/>
                               </a:rPr>
-                              <m:t>𝑓𝑎𝑛</m:t>
-                            </m:r>
-                            <m:r>
-                              <a:rPr lang="en-US" b="0" i="1" dirty="0" smtClean="0">
-                                <a:latin typeface="Cambria Math" panose="02040503050406030204" pitchFamily="18" charset="0"/>
-                              </a:rPr>
-                              <m:t>,</m:t>
-                            </m:r>
-                            <m:r>
-                              <a:rPr lang="en-US" b="0" i="1" dirty="0" smtClean="0">
-                                <a:latin typeface="Cambria Math" panose="02040503050406030204" pitchFamily="18" charset="0"/>
-                              </a:rPr>
-                              <m:t>𝑓</m:t>
+                              <m:t>𝑐h𝑖𝑙𝑙𝑒𝑟</m:t>
                             </m:r>
                           </m:sub>
                           <m:sup>
@@ -8728,47 +9362,14 @@
                             </m:r>
                           </m:sup>
                         </m:sSubSup>
+                        <m:r>
+                          <a:rPr lang="en-US" b="0" i="1" dirty="0" smtClean="0">
+                            <a:latin typeface="Cambria Math" panose="02040503050406030204" pitchFamily="18" charset="0"/>
+                          </a:rPr>
+                          <m:t>)</m:t>
+                        </m:r>
                       </m:e>
                     </m:nary>
-                    <m:r>
-                      <a:rPr lang="en-US" b="0" i="1" dirty="0" smtClean="0">
-                        <a:latin typeface="Cambria Math" panose="02040503050406030204" pitchFamily="18" charset="0"/>
-                      </a:rPr>
-                      <m:t>+</m:t>
-                    </m:r>
-                    <m:sSubSup>
-                      <m:sSubSupPr>
-                        <m:ctrlPr>
-                          <a:rPr lang="en-US" i="1" dirty="0">
-                            <a:latin typeface="Cambria Math" panose="02040503050406030204" pitchFamily="18" charset="0"/>
-                          </a:rPr>
-                        </m:ctrlPr>
-                      </m:sSubSupPr>
-                      <m:e>
-                        <m:r>
-                          <a:rPr lang="en-US" i="1" dirty="0">
-                            <a:latin typeface="Cambria Math" panose="02040503050406030204" pitchFamily="18" charset="0"/>
-                          </a:rPr>
-                          <m:t>𝑃</m:t>
-                        </m:r>
-                      </m:e>
-                      <m:sub>
-                        <m:r>
-                          <a:rPr lang="en-US" i="1" dirty="0">
-                            <a:latin typeface="Cambria Math" panose="02040503050406030204" pitchFamily="18" charset="0"/>
-                          </a:rPr>
-                          <m:t>𝑐h𝑖𝑙𝑙𝑒𝑟</m:t>
-                        </m:r>
-                      </m:sub>
-                      <m:sup>
-                        <m:r>
-                          <a:rPr lang="en-US" i="1" dirty="0">
-                            <a:latin typeface="Cambria Math" panose="02040503050406030204" pitchFamily="18" charset="0"/>
-                          </a:rPr>
-                          <m:t>𝑡</m:t>
-                        </m:r>
-                      </m:sup>
-                    </m:sSubSup>
                   </m:oMath>
                 </a14:m>
                 <a:endParaRPr lang="en-US" dirty="0"/>
@@ -8802,12 +9403,12 @@
             <p:spPr>
               <a:xfrm>
                 <a:off x="838200" y="1365662"/>
-                <a:ext cx="10515600" cy="4811301"/>
+                <a:ext cx="10933386" cy="4811301"/>
               </a:xfrm>
               <a:blipFill>
                 <a:blip r:embed="rId3"/>
                 <a:stretch>
-                  <a:fillRect l="-965" t="-2632" b="-13684"/>
+                  <a:fillRect l="-929" t="-1842" b="-13158"/>
                 </a:stretch>
               </a:blipFill>
             </p:spPr>

</xml_diff>

<commit_message>
minor changes to the slide
</commit_message>
<xml_diff>
--- a/Stochastic_TESS_Slide1.pptx
+++ b/Stochastic_TESS_Slide1.pptx
@@ -6937,12 +6937,12 @@
             <p:spPr>
               <a:xfrm>
                 <a:off x="838200" y="1365662"/>
-                <a:ext cx="10933386" cy="4811301"/>
+                <a:ext cx="10515600" cy="4811301"/>
               </a:xfrm>
             </p:spPr>
             <p:txBody>
               <a:bodyPr>
-                <a:normAutofit fontScale="92500"/>
+                <a:normAutofit fontScale="92500" lnSpcReduction="10000"/>
               </a:bodyPr>
               <a:lstStyle/>
               <a:p>
@@ -7865,7 +7865,7 @@
                 </a14:m>
                 <a:r>
                   <a:rPr lang="en-US" dirty="0"/>
-                  <a:t> are the zone cooling setpoints temperatures.</a:t>
+                  <a:t> are the zone cooling setpoints temperatures.(t=1,2,…,K)</a:t>
                 </a:r>
               </a:p>
               <a:p>
@@ -9403,12 +9403,12 @@
             <p:spPr>
               <a:xfrm>
                 <a:off x="838200" y="1365662"/>
-                <a:ext cx="10933386" cy="4811301"/>
+                <a:ext cx="10515600" cy="4811301"/>
               </a:xfrm>
               <a:blipFill>
                 <a:blip r:embed="rId3"/>
                 <a:stretch>
-                  <a:fillRect l="-929" t="-1842" b="-13158"/>
+                  <a:fillRect l="-965" t="-2632" b="-11579"/>
                 </a:stretch>
               </a:blipFill>
             </p:spPr>

</xml_diff>